<commit_message>
Add publisher notice to syllabus.  Finish lecture 1.  Start lecture 2.
</commit_message>
<xml_diff>
--- a/Week 1/01 - Basic Concepts of Computer Architecture.pptx
+++ b/Week 1/01 - Basic Concepts of Computer Architecture.pptx
@@ -5,10 +5,10 @@
     <p:sldMasterId id="2147483648" r:id="rId1"/>
   </p:sldMasterIdLst>
   <p:notesMasterIdLst>
-    <p:notesMasterId r:id="rId12"/>
+    <p:notesMasterId r:id="rId13"/>
   </p:notesMasterIdLst>
   <p:handoutMasterIdLst>
-    <p:handoutMasterId r:id="rId13"/>
+    <p:handoutMasterId r:id="rId14"/>
   </p:handoutMasterIdLst>
   <p:sldIdLst>
     <p:sldId id="265" r:id="rId2"/>
@@ -21,11 +21,12 @@
     <p:sldId id="323" r:id="rId9"/>
     <p:sldId id="324" r:id="rId10"/>
     <p:sldId id="325" r:id="rId11"/>
+    <p:sldId id="326" r:id="rId12"/>
   </p:sldIdLst>
   <p:sldSz cx="12188825" cy="6858000"/>
   <p:notesSz cx="6858000" cy="9144000"/>
   <p:custDataLst>
-    <p:tags r:id="rId14"/>
+    <p:tags r:id="rId15"/>
   </p:custDataLst>
   <p:defaultTextStyle>
     <a:defPPr>
@@ -1282,6 +1283,13 @@
         </dgm:presLayoutVars>
       </dgm:prSet>
       <dgm:spPr/>
+      <dgm:t>
+        <a:bodyPr/>
+        <a:lstStyle/>
+        <a:p>
+          <a:endParaRPr lang="en-US"/>
+        </a:p>
+      </dgm:t>
     </dgm:pt>
     <dgm:pt modelId="{366CFF54-5C8F-47F9-BFD8-D9AF3EADDA3E}" type="pres">
       <dgm:prSet presAssocID="{0E9DE493-19D7-4EC9-97C9-5F26233F1106}" presName="tSp" presStyleCnt="0"/>
@@ -1310,6 +1318,13 @@
         </dgm:presLayoutVars>
       </dgm:prSet>
       <dgm:spPr/>
+      <dgm:t>
+        <a:bodyPr/>
+        <a:lstStyle/>
+        <a:p>
+          <a:endParaRPr lang="en-US"/>
+        </a:p>
+      </dgm:t>
     </dgm:pt>
     <dgm:pt modelId="{BFE859F2-A9E8-4F95-9161-8EC68F2D30C4}" type="pres">
       <dgm:prSet presAssocID="{FB986F71-3126-4196-BD30-74AEDC39A1CA}" presName="childNode1tx" presStyleLbl="bgAcc1" presStyleIdx="0" presStyleCnt="3">
@@ -1318,6 +1333,13 @@
         </dgm:presLayoutVars>
       </dgm:prSet>
       <dgm:spPr/>
+      <dgm:t>
+        <a:bodyPr/>
+        <a:lstStyle/>
+        <a:p>
+          <a:endParaRPr lang="en-US"/>
+        </a:p>
+      </dgm:t>
     </dgm:pt>
     <dgm:pt modelId="{E18C6CF4-EDEB-4539-A36D-E0355B626199}" type="pres">
       <dgm:prSet presAssocID="{FB986F71-3126-4196-BD30-74AEDC39A1CA}" presName="parentNode1" presStyleLbl="node1" presStyleIdx="0" presStyleCnt="3">
@@ -1327,6 +1349,13 @@
         </dgm:presLayoutVars>
       </dgm:prSet>
       <dgm:spPr/>
+      <dgm:t>
+        <a:bodyPr/>
+        <a:lstStyle/>
+        <a:p>
+          <a:endParaRPr lang="en-US"/>
+        </a:p>
+      </dgm:t>
     </dgm:pt>
     <dgm:pt modelId="{D9FCD5E9-9E94-4534-BAB4-3DB8EB44E7D0}" type="pres">
       <dgm:prSet presAssocID="{FB986F71-3126-4196-BD30-74AEDC39A1CA}" presName="connSite1" presStyleCnt="0"/>
@@ -1335,6 +1364,13 @@
     <dgm:pt modelId="{6A63D16E-EEE6-4267-97EA-5AD7D2BC4E84}" type="pres">
       <dgm:prSet presAssocID="{D0B150DF-3AA4-454C-8652-25880449C422}" presName="Name9" presStyleLbl="sibTrans2D1" presStyleIdx="0" presStyleCnt="2"/>
       <dgm:spPr/>
+      <dgm:t>
+        <a:bodyPr/>
+        <a:lstStyle/>
+        <a:p>
+          <a:endParaRPr lang="en-US"/>
+        </a:p>
+      </dgm:t>
     </dgm:pt>
     <dgm:pt modelId="{59BAED1E-A4FE-4FA3-8716-57917AF47F38}" type="pres">
       <dgm:prSet presAssocID="{F6D27D1B-CDCB-481F-B8FA-AB31B2A119DE}" presName="composite2" presStyleCnt="0"/>
@@ -1351,6 +1387,13 @@
         </dgm:presLayoutVars>
       </dgm:prSet>
       <dgm:spPr/>
+      <dgm:t>
+        <a:bodyPr/>
+        <a:lstStyle/>
+        <a:p>
+          <a:endParaRPr lang="en-US"/>
+        </a:p>
+      </dgm:t>
     </dgm:pt>
     <dgm:pt modelId="{67FFE978-6FBE-4424-80BE-B9E4B4DD0695}" type="pres">
       <dgm:prSet presAssocID="{F6D27D1B-CDCB-481F-B8FA-AB31B2A119DE}" presName="childNode2tx" presStyleLbl="bgAcc1" presStyleIdx="1" presStyleCnt="3">
@@ -1359,6 +1402,13 @@
         </dgm:presLayoutVars>
       </dgm:prSet>
       <dgm:spPr/>
+      <dgm:t>
+        <a:bodyPr/>
+        <a:lstStyle/>
+        <a:p>
+          <a:endParaRPr lang="en-US"/>
+        </a:p>
+      </dgm:t>
     </dgm:pt>
     <dgm:pt modelId="{029D1FDE-4DD7-4FA5-8C70-0C747477B66C}" type="pres">
       <dgm:prSet presAssocID="{F6D27D1B-CDCB-481F-B8FA-AB31B2A119DE}" presName="parentNode2" presStyleLbl="node1" presStyleIdx="1" presStyleCnt="3">
@@ -1368,6 +1418,13 @@
         </dgm:presLayoutVars>
       </dgm:prSet>
       <dgm:spPr/>
+      <dgm:t>
+        <a:bodyPr/>
+        <a:lstStyle/>
+        <a:p>
+          <a:endParaRPr lang="en-US"/>
+        </a:p>
+      </dgm:t>
     </dgm:pt>
     <dgm:pt modelId="{C2556EF6-41FF-46C6-8829-911BFA533FFE}" type="pres">
       <dgm:prSet presAssocID="{F6D27D1B-CDCB-481F-B8FA-AB31B2A119DE}" presName="connSite2" presStyleCnt="0"/>
@@ -1376,6 +1433,13 @@
     <dgm:pt modelId="{DC2A0ADB-DCE3-4BF4-9952-0394865777AC}" type="pres">
       <dgm:prSet presAssocID="{7AEB6639-3258-49E8-8B1F-B4A9C61922BE}" presName="Name18" presStyleLbl="sibTrans2D1" presStyleIdx="1" presStyleCnt="2"/>
       <dgm:spPr/>
+      <dgm:t>
+        <a:bodyPr/>
+        <a:lstStyle/>
+        <a:p>
+          <a:endParaRPr lang="en-US"/>
+        </a:p>
+      </dgm:t>
     </dgm:pt>
     <dgm:pt modelId="{A874A3A3-A340-4ABC-99B5-7529D4415335}" type="pres">
       <dgm:prSet presAssocID="{58828492-5CEF-4AFE-95CB-5D7E6A18158B}" presName="composite1" presStyleCnt="0"/>
@@ -1392,6 +1456,13 @@
         </dgm:presLayoutVars>
       </dgm:prSet>
       <dgm:spPr/>
+      <dgm:t>
+        <a:bodyPr/>
+        <a:lstStyle/>
+        <a:p>
+          <a:endParaRPr lang="en-US"/>
+        </a:p>
+      </dgm:t>
     </dgm:pt>
     <dgm:pt modelId="{843715D2-C2C2-41EB-BDA3-21230FBA46DB}" type="pres">
       <dgm:prSet presAssocID="{58828492-5CEF-4AFE-95CB-5D7E6A18158B}" presName="childNode1tx" presStyleLbl="bgAcc1" presStyleIdx="2" presStyleCnt="3">
@@ -1400,6 +1471,13 @@
         </dgm:presLayoutVars>
       </dgm:prSet>
       <dgm:spPr/>
+      <dgm:t>
+        <a:bodyPr/>
+        <a:lstStyle/>
+        <a:p>
+          <a:endParaRPr lang="en-US"/>
+        </a:p>
+      </dgm:t>
     </dgm:pt>
     <dgm:pt modelId="{047F5837-10E2-4FFC-A492-DB8A19EF48CA}" type="pres">
       <dgm:prSet presAssocID="{58828492-5CEF-4AFE-95CB-5D7E6A18158B}" presName="parentNode1" presStyleLbl="node1" presStyleIdx="2" presStyleCnt="3">
@@ -1409,6 +1487,13 @@
         </dgm:presLayoutVars>
       </dgm:prSet>
       <dgm:spPr/>
+      <dgm:t>
+        <a:bodyPr/>
+        <a:lstStyle/>
+        <a:p>
+          <a:endParaRPr lang="en-US"/>
+        </a:p>
+      </dgm:t>
     </dgm:pt>
     <dgm:pt modelId="{7D6A154D-27BB-4CCE-9250-BCDD2CD5C383}" type="pres">
       <dgm:prSet presAssocID="{58828492-5CEF-4AFE-95CB-5D7E6A18158B}" presName="connSite1" presStyleCnt="0"/>
@@ -1416,36 +1501,36 @@
     </dgm:pt>
   </dgm:ptLst>
   <dgm:cxnLst>
-    <dgm:cxn modelId="{02F9F50D-9E37-4E0B-A2D3-55F7E73056AB}" srcId="{FB986F71-3126-4196-BD30-74AEDC39A1CA}" destId="{C042D8BB-54B2-4861-AECE-1C2176C2F403}" srcOrd="2" destOrd="0" parTransId="{84D87DE0-3AD5-47A6-924B-16C5F536CF3F}" sibTransId="{0926FB03-22E2-4548-84C2-9B93F8E8EE99}"/>
-    <dgm:cxn modelId="{CA96E113-7151-48C8-B4D5-7AA211772CC8}" srcId="{F6D27D1B-CDCB-481F-B8FA-AB31B2A119DE}" destId="{65B6D8B9-E558-4264-B37F-7B4B2A8896DF}" srcOrd="1" destOrd="0" parTransId="{04F5A724-3AA7-4E78-B992-BCB3E916993F}" sibTransId="{370A79FF-9957-49E1-811F-78AB198DD9E0}"/>
-    <dgm:cxn modelId="{1FE4D618-724E-4829-BED3-DAA3C651B769}" type="presOf" srcId="{0B00F5A8-A0EF-4111-9D86-004317B4F49E}" destId="{E83793B4-2C5C-4D90-82FA-E5EE4745664D}" srcOrd="0" destOrd="0" presId="urn:microsoft.com/office/officeart/2005/8/layout/hProcess4"/>
-    <dgm:cxn modelId="{A08CE81F-A93E-429F-943D-3B3662A0C042}" type="presOf" srcId="{F6D27D1B-CDCB-481F-B8FA-AB31B2A119DE}" destId="{029D1FDE-4DD7-4FA5-8C70-0C747477B66C}" srcOrd="0" destOrd="0" presId="urn:microsoft.com/office/officeart/2005/8/layout/hProcess4"/>
-    <dgm:cxn modelId="{ECE9152A-59A8-4A3A-9D34-DB38A074F636}" srcId="{0E9DE493-19D7-4EC9-97C9-5F26233F1106}" destId="{58828492-5CEF-4AFE-95CB-5D7E6A18158B}" srcOrd="2" destOrd="0" parTransId="{F664BA43-1B81-496F-A04E-CE4B4A525697}" sibTransId="{2D386477-EC66-449A-8D41-5F8A212C3D8E}"/>
-    <dgm:cxn modelId="{2D5B3E3B-3EE5-4072-933E-27DF5400591C}" srcId="{FB986F71-3126-4196-BD30-74AEDC39A1CA}" destId="{AB2E8498-CC81-452F-A895-08F3845AA347}" srcOrd="0" destOrd="0" parTransId="{4C65E2C8-0CBB-4D8C-AD60-6B0105C62B84}" sibTransId="{9A1F3304-AA9E-4FBC-89BA-9095C80E47C9}"/>
-    <dgm:cxn modelId="{E33DA73B-C4A7-472D-88E9-D1B7FEC0C1F5}" type="presOf" srcId="{BF381BD4-48DC-48BF-8C18-C307CDD4D490}" destId="{BFE859F2-A9E8-4F95-9161-8EC68F2D30C4}" srcOrd="1" destOrd="1" presId="urn:microsoft.com/office/officeart/2005/8/layout/hProcess4"/>
-    <dgm:cxn modelId="{8B37FE40-D7C8-473A-9D2D-D33173B003E6}" type="presOf" srcId="{6E7DBE00-7E5B-46F8-BBA0-CF0079A58E82}" destId="{843715D2-C2C2-41EB-BDA3-21230FBA46DB}" srcOrd="1" destOrd="1" presId="urn:microsoft.com/office/officeart/2005/8/layout/hProcess4"/>
+    <dgm:cxn modelId="{4E74EABF-20DE-46D5-9BE9-0F84CEAF66AB}" type="presOf" srcId="{D0B150DF-3AA4-454C-8652-25880449C422}" destId="{6A63D16E-EEE6-4267-97EA-5AD7D2BC4E84}" srcOrd="0" destOrd="0" presId="urn:microsoft.com/office/officeart/2005/8/layout/hProcess4"/>
+    <dgm:cxn modelId="{1423FC72-83C7-4510-8021-28EAEA493E68}" srcId="{0E9DE493-19D7-4EC9-97C9-5F26233F1106}" destId="{FB986F71-3126-4196-BD30-74AEDC39A1CA}" srcOrd="0" destOrd="0" parTransId="{9B3CE34A-9B3E-4D5F-94E0-DFBB94FF5A03}" sibTransId="{D0B150DF-3AA4-454C-8652-25880449C422}"/>
+    <dgm:cxn modelId="{550EC38B-566A-4081-A7BE-0E49BE02764D}" type="presOf" srcId="{AB2E8498-CC81-452F-A895-08F3845AA347}" destId="{BFE859F2-A9E8-4F95-9161-8EC68F2D30C4}" srcOrd="1" destOrd="0" presId="urn:microsoft.com/office/officeart/2005/8/layout/hProcess4"/>
+    <dgm:cxn modelId="{8E27CA96-4C9B-46E7-8E36-3E93C0E1EDB6}" type="presOf" srcId="{C042D8BB-54B2-4861-AECE-1C2176C2F403}" destId="{BFE859F2-A9E8-4F95-9161-8EC68F2D30C4}" srcOrd="1" destOrd="2" presId="urn:microsoft.com/office/officeart/2005/8/layout/hProcess4"/>
+    <dgm:cxn modelId="{A507C8D3-A0BB-44E4-82F7-15D18D34238D}" type="presOf" srcId="{68838C34-4D02-49F8-ADD7-BFA90D87B7EA}" destId="{843715D2-C2C2-41EB-BDA3-21230FBA46DB}" srcOrd="1" destOrd="0" presId="urn:microsoft.com/office/officeart/2005/8/layout/hProcess4"/>
     <dgm:cxn modelId="{241A4F42-3815-4A3A-A31B-C5E11FFB5E6D}" type="presOf" srcId="{FB986F71-3126-4196-BD30-74AEDC39A1CA}" destId="{E18C6CF4-EDEB-4539-A36D-E0355B626199}" srcOrd="0" destOrd="0" presId="urn:microsoft.com/office/officeart/2005/8/layout/hProcess4"/>
     <dgm:cxn modelId="{402F9D43-6A91-4B87-83A0-426BC9CD76A6}" type="presOf" srcId="{0B00F5A8-A0EF-4111-9D86-004317B4F49E}" destId="{67FFE978-6FBE-4424-80BE-B9E4B4DD0695}" srcOrd="1" destOrd="0" presId="urn:microsoft.com/office/officeart/2005/8/layout/hProcess4"/>
-    <dgm:cxn modelId="{1423FC72-83C7-4510-8021-28EAEA493E68}" srcId="{0E9DE493-19D7-4EC9-97C9-5F26233F1106}" destId="{FB986F71-3126-4196-BD30-74AEDC39A1CA}" srcOrd="0" destOrd="0" parTransId="{9B3CE34A-9B3E-4D5F-94E0-DFBB94FF5A03}" sibTransId="{D0B150DF-3AA4-454C-8652-25880449C422}"/>
+    <dgm:cxn modelId="{FA45DADE-266F-4B82-B02F-D2732D8D9F51}" type="presOf" srcId="{58828492-5CEF-4AFE-95CB-5D7E6A18158B}" destId="{047F5837-10E2-4FFC-A492-DB8A19EF48CA}" srcOrd="0" destOrd="0" presId="urn:microsoft.com/office/officeart/2005/8/layout/hProcess4"/>
     <dgm:cxn modelId="{4143D757-8617-4C89-8322-E3B29A1874AF}" srcId="{58828492-5CEF-4AFE-95CB-5D7E6A18158B}" destId="{68838C34-4D02-49F8-ADD7-BFA90D87B7EA}" srcOrd="0" destOrd="0" parTransId="{F2AD00AD-6A23-4C89-A107-68EF5D1F0B94}" sibTransId="{FFC4FCE7-6F2F-4F91-A74A-7C4C32A81657}"/>
+    <dgm:cxn modelId="{90D5F6C6-4E25-4C59-9DF6-6E2B25A59F46}" type="presOf" srcId="{68838C34-4D02-49F8-ADD7-BFA90D87B7EA}" destId="{69C28D3B-E083-42DF-9EA0-916CA12125A9}" srcOrd="0" destOrd="0" presId="urn:microsoft.com/office/officeart/2005/8/layout/hProcess4"/>
+    <dgm:cxn modelId="{D7E8F1D8-32FB-4D90-B87F-45CB44471EC2}" type="presOf" srcId="{C042D8BB-54B2-4861-AECE-1C2176C2F403}" destId="{96015622-8A46-45CF-A72A-2856B699B374}" srcOrd="0" destOrd="2" presId="urn:microsoft.com/office/officeart/2005/8/layout/hProcess4"/>
+    <dgm:cxn modelId="{A08CE81F-A93E-429F-943D-3B3662A0C042}" type="presOf" srcId="{F6D27D1B-CDCB-481F-B8FA-AB31B2A119DE}" destId="{029D1FDE-4DD7-4FA5-8C70-0C747477B66C}" srcOrd="0" destOrd="0" presId="urn:microsoft.com/office/officeart/2005/8/layout/hProcess4"/>
+    <dgm:cxn modelId="{8B37FE40-D7C8-473A-9D2D-D33173B003E6}" type="presOf" srcId="{6E7DBE00-7E5B-46F8-BBA0-CF0079A58E82}" destId="{843715D2-C2C2-41EB-BDA3-21230FBA46DB}" srcOrd="1" destOrd="1" presId="urn:microsoft.com/office/officeart/2005/8/layout/hProcess4"/>
+    <dgm:cxn modelId="{5F9EDECD-FB20-4615-B5EC-47255B2B532F}" srcId="{FB986F71-3126-4196-BD30-74AEDC39A1CA}" destId="{BF381BD4-48DC-48BF-8C18-C307CDD4D490}" srcOrd="1" destOrd="0" parTransId="{5D881325-883F-44A1-A5FB-E01856D07A5B}" sibTransId="{2C645F98-BC4B-4797-BC42-0872EA7B0575}"/>
+    <dgm:cxn modelId="{732F9AFA-01BF-4C18-A659-D951BF9FC05D}" type="presOf" srcId="{AB2E8498-CC81-452F-A895-08F3845AA347}" destId="{96015622-8A46-45CF-A72A-2856B699B374}" srcOrd="0" destOrd="0" presId="urn:microsoft.com/office/officeart/2005/8/layout/hProcess4"/>
+    <dgm:cxn modelId="{02F9F50D-9E37-4E0B-A2D3-55F7E73056AB}" srcId="{FB986F71-3126-4196-BD30-74AEDC39A1CA}" destId="{C042D8BB-54B2-4861-AECE-1C2176C2F403}" srcOrd="2" destOrd="0" parTransId="{84D87DE0-3AD5-47A6-924B-16C5F536CF3F}" sibTransId="{0926FB03-22E2-4548-84C2-9B93F8E8EE99}"/>
     <dgm:cxn modelId="{E1602188-B573-41FF-9095-7B40F9CA44C2}" type="presOf" srcId="{6E7DBE00-7E5B-46F8-BBA0-CF0079A58E82}" destId="{69C28D3B-E083-42DF-9EA0-916CA12125A9}" srcOrd="0" destOrd="1" presId="urn:microsoft.com/office/officeart/2005/8/layout/hProcess4"/>
-    <dgm:cxn modelId="{550EC38B-566A-4081-A7BE-0E49BE02764D}" type="presOf" srcId="{AB2E8498-CC81-452F-A895-08F3845AA347}" destId="{BFE859F2-A9E8-4F95-9161-8EC68F2D30C4}" srcOrd="1" destOrd="0" presId="urn:microsoft.com/office/officeart/2005/8/layout/hProcess4"/>
-    <dgm:cxn modelId="{8E27CA96-4C9B-46E7-8E36-3E93C0E1EDB6}" type="presOf" srcId="{C042D8BB-54B2-4861-AECE-1C2176C2F403}" destId="{BFE859F2-A9E8-4F95-9161-8EC68F2D30C4}" srcOrd="1" destOrd="2" presId="urn:microsoft.com/office/officeart/2005/8/layout/hProcess4"/>
+    <dgm:cxn modelId="{835CA1EF-8C73-4A92-AB14-7F18CFCB3BBE}" type="presOf" srcId="{65B6D8B9-E558-4264-B37F-7B4B2A8896DF}" destId="{67FFE978-6FBE-4424-80BE-B9E4B4DD0695}" srcOrd="1" destOrd="1" presId="urn:microsoft.com/office/officeart/2005/8/layout/hProcess4"/>
+    <dgm:cxn modelId="{E95209FE-82B0-40EF-AFE6-D8CCCCEA50E1}" type="presOf" srcId="{7AEB6639-3258-49E8-8B1F-B4A9C61922BE}" destId="{DC2A0ADB-DCE3-4BF4-9952-0394865777AC}" srcOrd="0" destOrd="0" presId="urn:microsoft.com/office/officeart/2005/8/layout/hProcess4"/>
     <dgm:cxn modelId="{A63D53AC-541A-4D09-9620-8B1C8D7B91DE}" srcId="{0E9DE493-19D7-4EC9-97C9-5F26233F1106}" destId="{F6D27D1B-CDCB-481F-B8FA-AB31B2A119DE}" srcOrd="1" destOrd="0" parTransId="{8A7BF306-8E53-4B16-9E7E-A79AE3DF6BE2}" sibTransId="{7AEB6639-3258-49E8-8B1F-B4A9C61922BE}"/>
-    <dgm:cxn modelId="{4E74EABF-20DE-46D5-9BE9-0F84CEAF66AB}" type="presOf" srcId="{D0B150DF-3AA4-454C-8652-25880449C422}" destId="{6A63D16E-EEE6-4267-97EA-5AD7D2BC4E84}" srcOrd="0" destOrd="0" presId="urn:microsoft.com/office/officeart/2005/8/layout/hProcess4"/>
+    <dgm:cxn modelId="{CA96E113-7151-48C8-B4D5-7AA211772CC8}" srcId="{F6D27D1B-CDCB-481F-B8FA-AB31B2A119DE}" destId="{65B6D8B9-E558-4264-B37F-7B4B2A8896DF}" srcOrd="1" destOrd="0" parTransId="{04F5A724-3AA7-4E78-B992-BCB3E916993F}" sibTransId="{370A79FF-9957-49E1-811F-78AB198DD9E0}"/>
+    <dgm:cxn modelId="{FCC960F1-FFDB-446D-9C7D-06DB34FE036C}" type="presOf" srcId="{BF381BD4-48DC-48BF-8C18-C307CDD4D490}" destId="{96015622-8A46-45CF-A72A-2856B699B374}" srcOrd="0" destOrd="1" presId="urn:microsoft.com/office/officeart/2005/8/layout/hProcess4"/>
+    <dgm:cxn modelId="{1FE4D618-724E-4829-BED3-DAA3C651B769}" type="presOf" srcId="{0B00F5A8-A0EF-4111-9D86-004317B4F49E}" destId="{E83793B4-2C5C-4D90-82FA-E5EE4745664D}" srcOrd="0" destOrd="0" presId="urn:microsoft.com/office/officeart/2005/8/layout/hProcess4"/>
+    <dgm:cxn modelId="{3D080EE7-BDF0-495B-A4FB-103A296CD73B}" srcId="{58828492-5CEF-4AFE-95CB-5D7E6A18158B}" destId="{6E7DBE00-7E5B-46F8-BBA0-CF0079A58E82}" srcOrd="1" destOrd="0" parTransId="{6FAC7821-43C2-4A12-9638-E9B1BDE7C8D8}" sibTransId="{65147ED7-18A4-49A5-9AEE-066FB0363316}"/>
     <dgm:cxn modelId="{95276BC3-D2A9-422F-9390-BED3FD8C7BB0}" type="presOf" srcId="{0E9DE493-19D7-4EC9-97C9-5F26233F1106}" destId="{3960CFF8-4383-4382-8D6D-F2A00F508E8D}" srcOrd="0" destOrd="0" presId="urn:microsoft.com/office/officeart/2005/8/layout/hProcess4"/>
+    <dgm:cxn modelId="{86F910E7-C9D0-48E5-A3A3-C70127E96FC1}" srcId="{F6D27D1B-CDCB-481F-B8FA-AB31B2A119DE}" destId="{0B00F5A8-A0EF-4111-9D86-004317B4F49E}" srcOrd="0" destOrd="0" parTransId="{EC916B99-8D26-4265-B7BE-BB461C68DA5C}" sibTransId="{CE48C676-980A-4BAC-A3C8-9ABC315DAE51}"/>
+    <dgm:cxn modelId="{ECE9152A-59A8-4A3A-9D34-DB38A074F636}" srcId="{0E9DE493-19D7-4EC9-97C9-5F26233F1106}" destId="{58828492-5CEF-4AFE-95CB-5D7E6A18158B}" srcOrd="2" destOrd="0" parTransId="{F664BA43-1B81-496F-A04E-CE4B4A525697}" sibTransId="{2D386477-EC66-449A-8D41-5F8A212C3D8E}"/>
     <dgm:cxn modelId="{7EBBAEC4-0282-4F3E-860C-A6A26E3998F2}" type="presOf" srcId="{65B6D8B9-E558-4264-B37F-7B4B2A8896DF}" destId="{E83793B4-2C5C-4D90-82FA-E5EE4745664D}" srcOrd="0" destOrd="1" presId="urn:microsoft.com/office/officeart/2005/8/layout/hProcess4"/>
-    <dgm:cxn modelId="{90D5F6C6-4E25-4C59-9DF6-6E2B25A59F46}" type="presOf" srcId="{68838C34-4D02-49F8-ADD7-BFA90D87B7EA}" destId="{69C28D3B-E083-42DF-9EA0-916CA12125A9}" srcOrd="0" destOrd="0" presId="urn:microsoft.com/office/officeart/2005/8/layout/hProcess4"/>
-    <dgm:cxn modelId="{5F9EDECD-FB20-4615-B5EC-47255B2B532F}" srcId="{FB986F71-3126-4196-BD30-74AEDC39A1CA}" destId="{BF381BD4-48DC-48BF-8C18-C307CDD4D490}" srcOrd="1" destOrd="0" parTransId="{5D881325-883F-44A1-A5FB-E01856D07A5B}" sibTransId="{2C645F98-BC4B-4797-BC42-0872EA7B0575}"/>
-    <dgm:cxn modelId="{A507C8D3-A0BB-44E4-82F7-15D18D34238D}" type="presOf" srcId="{68838C34-4D02-49F8-ADD7-BFA90D87B7EA}" destId="{843715D2-C2C2-41EB-BDA3-21230FBA46DB}" srcOrd="1" destOrd="0" presId="urn:microsoft.com/office/officeart/2005/8/layout/hProcess4"/>
-    <dgm:cxn modelId="{D7E8F1D8-32FB-4D90-B87F-45CB44471EC2}" type="presOf" srcId="{C042D8BB-54B2-4861-AECE-1C2176C2F403}" destId="{96015622-8A46-45CF-A72A-2856B699B374}" srcOrd="0" destOrd="2" presId="urn:microsoft.com/office/officeart/2005/8/layout/hProcess4"/>
-    <dgm:cxn modelId="{FA45DADE-266F-4B82-B02F-D2732D8D9F51}" type="presOf" srcId="{58828492-5CEF-4AFE-95CB-5D7E6A18158B}" destId="{047F5837-10E2-4FFC-A492-DB8A19EF48CA}" srcOrd="0" destOrd="0" presId="urn:microsoft.com/office/officeart/2005/8/layout/hProcess4"/>
-    <dgm:cxn modelId="{3D080EE7-BDF0-495B-A4FB-103A296CD73B}" srcId="{58828492-5CEF-4AFE-95CB-5D7E6A18158B}" destId="{6E7DBE00-7E5B-46F8-BBA0-CF0079A58E82}" srcOrd="1" destOrd="0" parTransId="{6FAC7821-43C2-4A12-9638-E9B1BDE7C8D8}" sibTransId="{65147ED7-18A4-49A5-9AEE-066FB0363316}"/>
-    <dgm:cxn modelId="{86F910E7-C9D0-48E5-A3A3-C70127E96FC1}" srcId="{F6D27D1B-CDCB-481F-B8FA-AB31B2A119DE}" destId="{0B00F5A8-A0EF-4111-9D86-004317B4F49E}" srcOrd="0" destOrd="0" parTransId="{EC916B99-8D26-4265-B7BE-BB461C68DA5C}" sibTransId="{CE48C676-980A-4BAC-A3C8-9ABC315DAE51}"/>
-    <dgm:cxn modelId="{835CA1EF-8C73-4A92-AB14-7F18CFCB3BBE}" type="presOf" srcId="{65B6D8B9-E558-4264-B37F-7B4B2A8896DF}" destId="{67FFE978-6FBE-4424-80BE-B9E4B4DD0695}" srcOrd="1" destOrd="1" presId="urn:microsoft.com/office/officeart/2005/8/layout/hProcess4"/>
-    <dgm:cxn modelId="{FCC960F1-FFDB-446D-9C7D-06DB34FE036C}" type="presOf" srcId="{BF381BD4-48DC-48BF-8C18-C307CDD4D490}" destId="{96015622-8A46-45CF-A72A-2856B699B374}" srcOrd="0" destOrd="1" presId="urn:microsoft.com/office/officeart/2005/8/layout/hProcess4"/>
-    <dgm:cxn modelId="{732F9AFA-01BF-4C18-A659-D951BF9FC05D}" type="presOf" srcId="{AB2E8498-CC81-452F-A895-08F3845AA347}" destId="{96015622-8A46-45CF-A72A-2856B699B374}" srcOrd="0" destOrd="0" presId="urn:microsoft.com/office/officeart/2005/8/layout/hProcess4"/>
-    <dgm:cxn modelId="{E95209FE-82B0-40EF-AFE6-D8CCCCEA50E1}" type="presOf" srcId="{7AEB6639-3258-49E8-8B1F-B4A9C61922BE}" destId="{DC2A0ADB-DCE3-4BF4-9952-0394865777AC}" srcOrd="0" destOrd="0" presId="urn:microsoft.com/office/officeart/2005/8/layout/hProcess4"/>
+    <dgm:cxn modelId="{E33DA73B-C4A7-472D-88E9-D1B7FEC0C1F5}" type="presOf" srcId="{BF381BD4-48DC-48BF-8C18-C307CDD4D490}" destId="{BFE859F2-A9E8-4F95-9161-8EC68F2D30C4}" srcOrd="1" destOrd="1" presId="urn:microsoft.com/office/officeart/2005/8/layout/hProcess4"/>
+    <dgm:cxn modelId="{2D5B3E3B-3EE5-4072-933E-27DF5400591C}" srcId="{FB986F71-3126-4196-BD30-74AEDC39A1CA}" destId="{AB2E8498-CC81-452F-A895-08F3845AA347}" srcOrd="0" destOrd="0" parTransId="{4C65E2C8-0CBB-4D8C-AD60-6B0105C62B84}" sibTransId="{9A1F3304-AA9E-4FBC-89BA-9095C80E47C9}"/>
     <dgm:cxn modelId="{89F19664-F574-44B4-924E-3D107B743F23}" type="presParOf" srcId="{3960CFF8-4383-4382-8D6D-F2A00F508E8D}" destId="{366CFF54-5C8F-47F9-BFD8-D9AF3EADDA3E}" srcOrd="0" destOrd="0" presId="urn:microsoft.com/office/officeart/2005/8/layout/hProcess4"/>
     <dgm:cxn modelId="{75C41B37-1CBE-4C45-8C4B-850855BD27C4}" type="presParOf" srcId="{3960CFF8-4383-4382-8D6D-F2A00F508E8D}" destId="{13688FBD-4079-41FE-A6A2-B5B0F293E6BF}" srcOrd="1" destOrd="0" presId="urn:microsoft.com/office/officeart/2005/8/layout/hProcess4"/>
     <dgm:cxn modelId="{3AA8FE4E-D0FB-4F4F-9F35-7B6B4E7D5E8D}" type="presParOf" srcId="{3960CFF8-4383-4382-8D6D-F2A00F508E8D}" destId="{224851B6-C14D-49DE-883B-A13003DA4601}" srcOrd="2" destOrd="0" presId="urn:microsoft.com/office/officeart/2005/8/layout/hProcess4"/>
@@ -1554,7 +1639,7 @@
             <a:spcAft>
               <a:spcPct val="15000"/>
             </a:spcAft>
-            <a:buChar char="•"/>
+            <a:buChar char="••"/>
           </a:pPr>
           <a:r>
             <a:rPr lang="en-US" sz="2800" kern="1200" dirty="0"/>
@@ -1572,7 +1657,7 @@
             <a:spcAft>
               <a:spcPct val="15000"/>
             </a:spcAft>
-            <a:buChar char="•"/>
+            <a:buChar char="••"/>
           </a:pPr>
           <a:r>
             <a:rPr lang="en-US" sz="2800" kern="1200" dirty="0"/>
@@ -1590,7 +1675,7 @@
             <a:spcAft>
               <a:spcPct val="15000"/>
             </a:spcAft>
-            <a:buChar char="•"/>
+            <a:buChar char="••"/>
           </a:pPr>
           <a:r>
             <a:rPr lang="en-US" sz="2800" kern="1200" dirty="0"/>
@@ -1708,7 +1793,7 @@
         </a:bodyPr>
         <a:lstStyle/>
         <a:p>
-          <a:pPr marL="0" lvl="0" indent="0" algn="ctr" defTabSz="1155700">
+          <a:pPr lvl="0" algn="ctr" defTabSz="1155700">
             <a:lnSpc>
               <a:spcPct val="90000"/>
             </a:lnSpc>
@@ -1718,7 +1803,6 @@
             <a:spcAft>
               <a:spcPct val="35000"/>
             </a:spcAft>
-            <a:buNone/>
           </a:pPr>
           <a:r>
             <a:rPr lang="en-US" sz="2600" kern="1200" dirty="0"/>
@@ -1797,7 +1881,7 @@
             <a:spcAft>
               <a:spcPct val="15000"/>
             </a:spcAft>
-            <a:buChar char="•"/>
+            <a:buChar char="••"/>
           </a:pPr>
           <a:r>
             <a:rPr lang="en-US" sz="2800" kern="1200" dirty="0"/>
@@ -1815,7 +1899,7 @@
             <a:spcAft>
               <a:spcPct val="15000"/>
             </a:spcAft>
-            <a:buChar char="•"/>
+            <a:buChar char="••"/>
           </a:pPr>
           <a:r>
             <a:rPr lang="en-US" sz="2800" kern="1200" dirty="0"/>
@@ -1933,7 +2017,7 @@
         </a:bodyPr>
         <a:lstStyle/>
         <a:p>
-          <a:pPr marL="0" lvl="0" indent="0" algn="ctr" defTabSz="1155700">
+          <a:pPr lvl="0" algn="ctr" defTabSz="1155700">
             <a:lnSpc>
               <a:spcPct val="90000"/>
             </a:lnSpc>
@@ -1943,7 +2027,6 @@
             <a:spcAft>
               <a:spcPct val="35000"/>
             </a:spcAft>
-            <a:buNone/>
           </a:pPr>
           <a:r>
             <a:rPr lang="en-US" sz="2600" kern="1200" dirty="0"/>
@@ -2022,7 +2105,7 @@
             <a:spcAft>
               <a:spcPct val="15000"/>
             </a:spcAft>
-            <a:buChar char="•"/>
+            <a:buChar char="••"/>
           </a:pPr>
           <a:r>
             <a:rPr lang="en-US" sz="2800" kern="1200" dirty="0"/>
@@ -2040,7 +2123,7 @@
             <a:spcAft>
               <a:spcPct val="15000"/>
             </a:spcAft>
-            <a:buChar char="•"/>
+            <a:buChar char="••"/>
           </a:pPr>
           <a:r>
             <a:rPr lang="en-US" sz="2800" kern="1200" dirty="0"/>
@@ -2110,7 +2193,7 @@
         </a:bodyPr>
         <a:lstStyle/>
         <a:p>
-          <a:pPr marL="0" lvl="0" indent="0" algn="ctr" defTabSz="1155700">
+          <a:pPr lvl="0" algn="ctr" defTabSz="1155700">
             <a:lnSpc>
               <a:spcPct val="90000"/>
             </a:lnSpc>
@@ -2120,7 +2203,6 @@
             <a:spcAft>
               <a:spcPct val="35000"/>
             </a:spcAft>
-            <a:buNone/>
           </a:pPr>
           <a:r>
             <a:rPr lang="en-US" sz="2600" kern="1200" dirty="0"/>
@@ -3797,7 +3879,7 @@
           <a:p>
             <a:fld id="{59088EAF-6ECA-4616-85EF-35AA19C641F3}" type="datetimeFigureOut">
               <a:rPr lang="en-US"/>
-              <a:t>2/7/2018</a:t>
+              <a:t>2/13/2018</a:t>
             </a:fld>
             <a:endParaRPr/>
           </a:p>
@@ -3962,7 +4044,7 @@
           <a:p>
             <a:fld id="{3ABD2D7A-D230-4F91-BD59-0A39C2703BA8}" type="datetimeFigureOut">
               <a:rPr lang="en-US"/>
-              <a:t>2/7/2018</a:t>
+              <a:t>2/13/2018</a:t>
             </a:fld>
             <a:endParaRPr/>
           </a:p>
@@ -4571,7 +4653,7 @@
           <a:p>
             <a:fld id="{03F41C87-7AD9-4845-A077-840E4A0F3F06}" type="datetimeFigureOut">
               <a:rPr lang="en-US"/>
-              <a:t>2/7/2018</a:t>
+              <a:t>2/13/2018</a:t>
             </a:fld>
             <a:endParaRPr/>
           </a:p>
@@ -4763,7 +4845,7 @@
           <a:p>
             <a:fld id="{03F41C87-7AD9-4845-A077-840E4A0F3F06}" type="datetimeFigureOut">
               <a:rPr lang="en-US"/>
-              <a:t>2/7/2018</a:t>
+              <a:t>2/13/2018</a:t>
             </a:fld>
             <a:endParaRPr/>
           </a:p>
@@ -4952,7 +5034,7 @@
           <a:p>
             <a:fld id="{03F41C87-7AD9-4845-A077-840E4A0F3F06}" type="datetimeFigureOut">
               <a:rPr lang="en-US"/>
-              <a:t>2/7/2018</a:t>
+              <a:t>2/13/2018</a:t>
             </a:fld>
             <a:endParaRPr/>
           </a:p>
@@ -5232,7 +5314,7 @@
           <a:p>
             <a:fld id="{03F41C87-7AD9-4845-A077-840E4A0F3F06}" type="datetimeFigureOut">
               <a:rPr lang="en-US"/>
-              <a:t>2/7/2018</a:t>
+              <a:t>2/13/2018</a:t>
             </a:fld>
             <a:endParaRPr/>
           </a:p>
@@ -5536,7 +5618,7 @@
           <a:p>
             <a:fld id="{03F41C87-7AD9-4845-A077-840E4A0F3F06}" type="datetimeFigureOut">
               <a:rPr lang="en-US"/>
-              <a:t>2/7/2018</a:t>
+              <a:t>2/13/2018</a:t>
             </a:fld>
             <a:endParaRPr/>
           </a:p>
@@ -5992,7 +6074,7 @@
           <a:p>
             <a:fld id="{03F41C87-7AD9-4845-A077-840E4A0F3F06}" type="datetimeFigureOut">
               <a:rPr lang="en-US"/>
-              <a:t>2/7/2018</a:t>
+              <a:t>2/13/2018</a:t>
             </a:fld>
             <a:endParaRPr/>
           </a:p>
@@ -6122,7 +6204,7 @@
           <a:p>
             <a:fld id="{03F41C87-7AD9-4845-A077-840E4A0F3F06}" type="datetimeFigureOut">
               <a:rPr lang="en-US"/>
-              <a:t>2/7/2018</a:t>
+              <a:t>2/13/2018</a:t>
             </a:fld>
             <a:endParaRPr/>
           </a:p>
@@ -6237,7 +6319,7 @@
           <a:p>
             <a:fld id="{03F41C87-7AD9-4845-A077-840E4A0F3F06}" type="datetimeFigureOut">
               <a:rPr lang="en-US"/>
-              <a:t>2/7/2018</a:t>
+              <a:t>2/13/2018</a:t>
             </a:fld>
             <a:endParaRPr/>
           </a:p>
@@ -6559,7 +6641,7 @@
           <a:p>
             <a:fld id="{03F41C87-7AD9-4845-A077-840E4A0F3F06}" type="datetimeFigureOut">
               <a:rPr lang="en-US"/>
-              <a:t>2/7/2018</a:t>
+              <a:t>2/13/2018</a:t>
             </a:fld>
             <a:endParaRPr/>
           </a:p>
@@ -6871,7 +6953,7 @@
             <a:fld id="{03F41C87-7AD9-4845-A077-840E4A0F3F06}" type="datetimeFigureOut">
               <a:rPr lang="en-US"/>
               <a:pPr/>
-              <a:t>2/7/2018</a:t>
+              <a:t>2/13/2018</a:t>
             </a:fld>
             <a:endParaRPr/>
           </a:p>
@@ -7125,7 +7207,7 @@
             <a:fld id="{03F41C87-7AD9-4845-A077-840E4A0F3F06}" type="datetimeFigureOut">
               <a:rPr lang="en-US" smtClean="0"/>
               <a:pPr/>
-              <a:t>2/7/2018</a:t>
+              <a:t>2/13/2018</a:t>
             </a:fld>
             <a:endParaRPr lang="en-US"/>
           </a:p>
@@ -7655,7 +7737,7 @@
           <p:cNvPr id="3" name="Content Placeholder 2">
             <a:extLst>
               <a:ext uri="{FF2B5EF4-FFF2-40B4-BE49-F238E27FC236}">
-                <a16:creationId xmlns:a16="http://schemas.microsoft.com/office/drawing/2014/main" id="{9ACAD193-9195-4223-B2E6-3ED6534320F1}"/>
+                <a16:creationId xmlns:a16="http://schemas.microsoft.com/office/drawing/2014/main" xmlns="" id="{9ACAD193-9195-4223-B2E6-3ED6534320F1}"/>
               </a:ext>
             </a:extLst>
           </p:cNvPr>
@@ -7672,24 +7754,506 @@
           <a:lstStyle/>
           <a:p>
             <a:r>
+              <a:rPr lang="en-US" dirty="0" smtClean="0"/>
+              <a:t>Addition</a:t>
+            </a:r>
+          </a:p>
+          <a:p>
+            <a:pPr lvl="1"/>
+            <a:r>
+              <a:rPr lang="en-US" dirty="0" smtClean="0"/>
+              <a:t>Example on page 12</a:t>
+            </a:r>
+            <a:endParaRPr lang="en-US" dirty="0"/>
+          </a:p>
+          <a:p>
+            <a:r>
+              <a:rPr lang="en-US" dirty="0" smtClean="0"/>
+              <a:t>Subtraction</a:t>
+            </a:r>
+          </a:p>
+          <a:p>
+            <a:pPr lvl="1"/>
+            <a:r>
+              <a:rPr lang="en-US" dirty="0" smtClean="0"/>
+              <a:t>Also addition</a:t>
+            </a:r>
+          </a:p>
+          <a:p>
+            <a:pPr lvl="1"/>
+            <a:r>
+              <a:rPr lang="en-US" dirty="0" smtClean="0"/>
+              <a:t>Two’s compliment</a:t>
+            </a:r>
+          </a:p>
+          <a:p>
+            <a:pPr lvl="2"/>
+            <a:r>
+              <a:rPr lang="en-US" dirty="0" smtClean="0"/>
+              <a:t>What type of gate could we use for this?</a:t>
+            </a:r>
+          </a:p>
+          <a:p>
+            <a:pPr marL="463550" lvl="2" indent="0">
+              <a:buNone/>
+            </a:pPr>
+            <a:endParaRPr lang="en-US" dirty="0" smtClean="0"/>
+          </a:p>
+          <a:p>
+            <a:pPr lvl="1"/>
+            <a:endParaRPr lang="en-US" dirty="0" smtClean="0"/>
+          </a:p>
+          <a:p>
+            <a:r>
+              <a:rPr lang="en-US" dirty="0" smtClean="0"/>
+              <a:t>Signed </a:t>
+            </a:r>
+            <a:r>
               <a:rPr lang="en-US" dirty="0"/>
+              <a:t>versus Unsigned</a:t>
+            </a:r>
+          </a:p>
+        </p:txBody>
+      </p:sp>
+      <p:sp>
+        <p:nvSpPr>
+          <p:cNvPr id="8" name="Content Placeholder 2">
+            <a:extLst>
+              <a:ext uri="{FF2B5EF4-FFF2-40B4-BE49-F238E27FC236}">
+                <a16:creationId xmlns:a16="http://schemas.microsoft.com/office/drawing/2014/main" xmlns="" id="{9ACAD193-9195-4223-B2E6-3ED6534320F1}"/>
+              </a:ext>
+            </a:extLst>
+          </p:cNvPr>
+          <p:cNvSpPr txBox="1">
+            <a:spLocks/>
+          </p:cNvSpPr>
+          <p:nvPr/>
+        </p:nvSpPr>
+        <p:spPr>
+          <a:xfrm>
+            <a:off x="1522413" y="1904999"/>
+            <a:ext cx="9134391" cy="4572001"/>
+          </a:xfrm>
+          <a:prstGeom prst="rect">
+            <a:avLst/>
+          </a:prstGeom>
+        </p:spPr>
+        <p:txBody>
+          <a:bodyPr vert="horz" lIns="91440" tIns="45720" rIns="91440" bIns="45720" rtlCol="0">
+            <a:normAutofit/>
+          </a:bodyPr>
+          <a:lstStyle>
+            <a:lvl1pPr marL="223838" indent="-223838" algn="l" defTabSz="914400" rtl="0" eaLnBrk="1" latinLnBrk="0" hangingPunct="1">
+              <a:lnSpc>
+                <a:spcPct val="90000"/>
+              </a:lnSpc>
+              <a:spcBef>
+                <a:spcPts val="1800"/>
+              </a:spcBef>
+              <a:buClr>
+                <a:schemeClr val="accent1"/>
+              </a:buClr>
+              <a:buSzPct val="100000"/>
+              <a:buFont typeface="Arial" pitchFamily="34" charset="0"/>
+              <a:buChar char="•"/>
+              <a:defRPr sz="2400" kern="1200">
+                <a:solidFill>
+                  <a:schemeClr val="tx1"/>
+                </a:solidFill>
+                <a:latin typeface="+mn-lt"/>
+                <a:ea typeface="+mn-ea"/>
+                <a:cs typeface="+mn-cs"/>
+              </a:defRPr>
+            </a:lvl1pPr>
+            <a:lvl2pPr marL="463550" indent="-231775" algn="l" defTabSz="914400" rtl="0" eaLnBrk="1" latinLnBrk="0" hangingPunct="1">
+              <a:lnSpc>
+                <a:spcPct val="90000"/>
+              </a:lnSpc>
+              <a:spcBef>
+                <a:spcPts val="1200"/>
+              </a:spcBef>
+              <a:buClr>
+                <a:schemeClr val="accent1"/>
+              </a:buClr>
+              <a:buSzPct val="100000"/>
+              <a:buFont typeface="Arial" pitchFamily="34" charset="0"/>
+              <a:buChar char="•"/>
+              <a:defRPr sz="2000" kern="1200">
+                <a:solidFill>
+                  <a:schemeClr val="tx1"/>
+                </a:solidFill>
+                <a:latin typeface="+mn-lt"/>
+                <a:ea typeface="+mn-ea"/>
+                <a:cs typeface="+mn-cs"/>
+              </a:defRPr>
+            </a:lvl2pPr>
+            <a:lvl3pPr marL="682625" indent="-219075" algn="l" defTabSz="914400" rtl="0" eaLnBrk="1" latinLnBrk="0" hangingPunct="1">
+              <a:lnSpc>
+                <a:spcPct val="90000"/>
+              </a:lnSpc>
+              <a:spcBef>
+                <a:spcPts val="600"/>
+              </a:spcBef>
+              <a:buClr>
+                <a:schemeClr val="accent1"/>
+              </a:buClr>
+              <a:buSzPct val="100000"/>
+              <a:buFont typeface="Arial" pitchFamily="34" charset="0"/>
+              <a:buChar char="•"/>
+              <a:defRPr sz="1800" kern="1200">
+                <a:solidFill>
+                  <a:schemeClr val="tx1"/>
+                </a:solidFill>
+                <a:latin typeface="+mn-lt"/>
+                <a:ea typeface="+mn-ea"/>
+                <a:cs typeface="+mn-cs"/>
+              </a:defRPr>
+            </a:lvl3pPr>
+            <a:lvl4pPr marL="857250" indent="-174625" algn="l" defTabSz="914400" rtl="0" eaLnBrk="1" latinLnBrk="0" hangingPunct="1">
+              <a:lnSpc>
+                <a:spcPct val="90000"/>
+              </a:lnSpc>
+              <a:spcBef>
+                <a:spcPts val="600"/>
+              </a:spcBef>
+              <a:buClr>
+                <a:schemeClr val="accent1"/>
+              </a:buClr>
+              <a:buSzPct val="100000"/>
+              <a:buFont typeface="Arial" pitchFamily="34" charset="0"/>
+              <a:buChar char="•"/>
+              <a:defRPr sz="1600" kern="1200">
+                <a:solidFill>
+                  <a:schemeClr val="tx1"/>
+                </a:solidFill>
+                <a:latin typeface="+mn-lt"/>
+                <a:ea typeface="+mn-ea"/>
+                <a:cs typeface="+mn-cs"/>
+              </a:defRPr>
+            </a:lvl4pPr>
+            <a:lvl5pPr marL="1030288" indent="-173038" algn="l" defTabSz="914400" rtl="0" eaLnBrk="1" latinLnBrk="0" hangingPunct="1">
+              <a:lnSpc>
+                <a:spcPct val="90000"/>
+              </a:lnSpc>
+              <a:spcBef>
+                <a:spcPts val="600"/>
+              </a:spcBef>
+              <a:buClr>
+                <a:schemeClr val="accent1"/>
+              </a:buClr>
+              <a:buSzPct val="100000"/>
+              <a:buFont typeface="Arial" pitchFamily="34" charset="0"/>
+              <a:buChar char="•"/>
+              <a:defRPr sz="1600" kern="1200">
+                <a:solidFill>
+                  <a:schemeClr val="tx1"/>
+                </a:solidFill>
+                <a:latin typeface="+mn-lt"/>
+                <a:ea typeface="+mn-ea"/>
+                <a:cs typeface="+mn-cs"/>
+              </a:defRPr>
+            </a:lvl5pPr>
+            <a:lvl6pPr marL="1207008" indent="-173736" algn="l" defTabSz="914400" rtl="0" eaLnBrk="1" latinLnBrk="0" hangingPunct="1">
+              <a:spcBef>
+                <a:spcPts val="600"/>
+              </a:spcBef>
+              <a:buClr>
+                <a:schemeClr val="accent1"/>
+              </a:buClr>
+              <a:buFont typeface="Arial" pitchFamily="34" charset="0"/>
+              <a:buChar char="•"/>
+              <a:defRPr sz="1600" kern="1200">
+                <a:solidFill>
+                  <a:schemeClr val="tx1"/>
+                </a:solidFill>
+                <a:latin typeface="+mn-lt"/>
+                <a:ea typeface="+mn-ea"/>
+                <a:cs typeface="+mn-cs"/>
+              </a:defRPr>
+            </a:lvl6pPr>
+            <a:lvl7pPr marL="1380744" indent="-173736" algn="l" defTabSz="914400" rtl="0" eaLnBrk="1" latinLnBrk="0" hangingPunct="1">
+              <a:spcBef>
+                <a:spcPts val="600"/>
+              </a:spcBef>
+              <a:buClr>
+                <a:schemeClr val="accent1"/>
+              </a:buClr>
+              <a:buFont typeface="Arial" pitchFamily="34" charset="0"/>
+              <a:buChar char="•"/>
+              <a:defRPr sz="1600" kern="1200">
+                <a:solidFill>
+                  <a:schemeClr val="tx1"/>
+                </a:solidFill>
+                <a:latin typeface="+mn-lt"/>
+                <a:ea typeface="+mn-ea"/>
+                <a:cs typeface="+mn-cs"/>
+              </a:defRPr>
+            </a:lvl7pPr>
+            <a:lvl8pPr marL="1554480" indent="-173736" algn="l" defTabSz="914400" rtl="0" eaLnBrk="1" latinLnBrk="0" hangingPunct="1">
+              <a:spcBef>
+                <a:spcPts val="600"/>
+              </a:spcBef>
+              <a:buClr>
+                <a:schemeClr val="accent1"/>
+              </a:buClr>
+              <a:buFont typeface="Arial" pitchFamily="34" charset="0"/>
+              <a:buChar char="•"/>
+              <a:defRPr sz="1600" kern="1200">
+                <a:solidFill>
+                  <a:schemeClr val="tx1"/>
+                </a:solidFill>
+                <a:latin typeface="+mn-lt"/>
+                <a:ea typeface="+mn-ea"/>
+                <a:cs typeface="+mn-cs"/>
+              </a:defRPr>
+            </a:lvl8pPr>
+            <a:lvl9pPr marL="1728216" indent="-173736" algn="l" defTabSz="914400" rtl="0" eaLnBrk="1" latinLnBrk="0" hangingPunct="1">
+              <a:spcBef>
+                <a:spcPts val="600"/>
+              </a:spcBef>
+              <a:buClr>
+                <a:schemeClr val="accent1"/>
+              </a:buClr>
+              <a:buFont typeface="Arial" pitchFamily="34" charset="0"/>
+              <a:buChar char="•"/>
+              <a:defRPr sz="1600" kern="1200">
+                <a:solidFill>
+                  <a:schemeClr val="tx1"/>
+                </a:solidFill>
+                <a:latin typeface="+mn-lt"/>
+                <a:ea typeface="+mn-ea"/>
+                <a:cs typeface="+mn-cs"/>
+              </a:defRPr>
+            </a:lvl9pPr>
+          </a:lstStyle>
+          <a:p>
+            <a:r>
+              <a:rPr lang="en-US" dirty="0" smtClean="0"/>
               <a:t>Addition</a:t>
             </a:r>
           </a:p>
           <a:p>
-            <a:r>
-              <a:rPr lang="en-US" dirty="0" err="1"/>
-              <a:t>SubtractionSuppose</a:t>
+            <a:pPr lvl="1"/>
+            <a:r>
+              <a:rPr lang="en-US" dirty="0" smtClean="0"/>
+              <a:t>Example on page 12</a:t>
+            </a:r>
+          </a:p>
+          <a:p>
+            <a:r>
+              <a:rPr lang="en-US" dirty="0" smtClean="0"/>
+              <a:t>Subtraction</a:t>
+            </a:r>
+          </a:p>
+          <a:p>
+            <a:pPr lvl="1"/>
+            <a:r>
+              <a:rPr lang="en-US" dirty="0" smtClean="0"/>
+              <a:t>Also addition</a:t>
+            </a:r>
+          </a:p>
+          <a:p>
+            <a:pPr lvl="1"/>
+            <a:r>
+              <a:rPr lang="en-US" dirty="0" smtClean="0"/>
+              <a:t>Two’s compliment</a:t>
+            </a:r>
+          </a:p>
+          <a:p>
+            <a:pPr lvl="2"/>
+            <a:r>
+              <a:rPr lang="en-US" dirty="0" smtClean="0"/>
+              <a:t>What type of gate could we use for this?</a:t>
+            </a:r>
+          </a:p>
+          <a:p>
+            <a:pPr lvl="2"/>
+            <a:endParaRPr lang="en-US" dirty="0" smtClean="0"/>
+          </a:p>
+          <a:p>
+            <a:pPr lvl="1"/>
+            <a:endParaRPr lang="en-US" dirty="0" smtClean="0"/>
+          </a:p>
+          <a:p>
+            <a:r>
+              <a:rPr lang="en-US" dirty="0" smtClean="0"/>
+              <a:t>Signed versus Unsigned</a:t>
+            </a:r>
+            <a:endParaRPr lang="en-US" dirty="0"/>
+          </a:p>
+        </p:txBody>
+      </p:sp>
+      <p:pic>
+        <p:nvPicPr>
+          <p:cNvPr id="9" name="Picture 2" descr="https://upload.wikimedia.org/wikipedia/commons/a/a2/254px_3gate_XOR.jpg"/>
+          <p:cNvPicPr>
+            <a:picLocks noChangeAspect="1" noChangeArrowheads="1"/>
+          </p:cNvPicPr>
+          <p:nvPr/>
+        </p:nvPicPr>
+        <p:blipFill>
+          <a:blip r:embed="rId2">
+            <a:extLst>
+              <a:ext uri="{28A0092B-C50C-407E-A947-70E740481C1C}">
+                <a14:useLocalDpi xmlns:a14="http://schemas.microsoft.com/office/drawing/2010/main" val="0"/>
+              </a:ext>
+            </a:extLst>
+          </a:blip>
+          <a:srcRect/>
+          <a:stretch>
+            <a:fillRect/>
+          </a:stretch>
+        </p:blipFill>
+        <p:spPr bwMode="auto">
+          <a:xfrm>
+            <a:off x="6627812" y="4038600"/>
+            <a:ext cx="2419350" cy="952500"/>
+          </a:xfrm>
+          <a:prstGeom prst="rect">
+            <a:avLst/>
+          </a:prstGeom>
+          <a:noFill/>
+          <a:extLst>
+            <a:ext uri="{909E8E84-426E-40DD-AFC4-6F175D3DCCD1}">
+              <a14:hiddenFill xmlns:a14="http://schemas.microsoft.com/office/drawing/2010/main">
+                <a:solidFill>
+                  <a:srgbClr val="FFFFFF"/>
+                </a:solidFill>
+              </a14:hiddenFill>
+            </a:ext>
+          </a:extLst>
+        </p:spPr>
+      </p:pic>
+    </p:spTree>
+    <p:extLst>
+      <p:ext uri="{BB962C8B-B14F-4D97-AF65-F5344CB8AC3E}">
+        <p14:creationId xmlns:p14="http://schemas.microsoft.com/office/powerpoint/2010/main" val="2215522167"/>
+      </p:ext>
+    </p:extLst>
+  </p:cSld>
+  <p:clrMapOvr>
+    <a:masterClrMapping/>
+  </p:clrMapOvr>
+  <mc:AlternateContent xmlns:mc="http://schemas.openxmlformats.org/markup-compatibility/2006" xmlns:p14="http://schemas.microsoft.com/office/powerpoint/2010/main">
+    <mc:Choice Requires="p14">
+      <p:transition spd="med" p14:dur="700">
+        <p:fade/>
+      </p:transition>
+    </mc:Choice>
+    <mc:Fallback xmlns="">
+      <p:transition spd="med">
+        <p:fade/>
+      </p:transition>
+    </mc:Fallback>
+  </mc:AlternateContent>
+</p:sld>
+</file>
+
+<file path=ppt/slides/slide11.xml><?xml version="1.0" encoding="utf-8"?>
+<p:sld xmlns:a="http://schemas.openxmlformats.org/drawingml/2006/main" xmlns:r="http://schemas.openxmlformats.org/officeDocument/2006/relationships" xmlns:p="http://schemas.openxmlformats.org/presentationml/2006/main">
+  <p:cSld>
+    <p:spTree>
+      <p:nvGrpSpPr>
+        <p:cNvPr id="1" name=""/>
+        <p:cNvGrpSpPr/>
+        <p:nvPr/>
+      </p:nvGrpSpPr>
+      <p:grpSpPr>
+        <a:xfrm>
+          <a:off x="0" y="0"/>
+          <a:ext cx="0" cy="0"/>
+          <a:chOff x="0" y="0"/>
+          <a:chExt cx="0" cy="0"/>
+        </a:xfrm>
+      </p:grpSpPr>
+      <p:sp>
+        <p:nvSpPr>
+          <p:cNvPr id="13" name="Title 12"/>
+          <p:cNvSpPr>
+            <a:spLocks noGrp="1"/>
+          </p:cNvSpPr>
+          <p:nvPr>
+            <p:ph type="title"/>
+          </p:nvPr>
+        </p:nvSpPr>
+        <p:spPr/>
+        <p:txBody>
+          <a:bodyPr/>
+          <a:lstStyle/>
+          <a:p>
+            <a:r>
+              <a:rPr lang="en-US" dirty="0" smtClean="0"/>
+              <a:t>Hexadecimal Arithmetic</a:t>
+            </a:r>
+            <a:endParaRPr lang="en-US" dirty="0"/>
+          </a:p>
+        </p:txBody>
+      </p:sp>
+      <p:sp>
+        <p:nvSpPr>
+          <p:cNvPr id="3" name="Content Placeholder 2">
+            <a:extLst>
+              <a:ext uri="{FF2B5EF4-FFF2-40B4-BE49-F238E27FC236}">
+                <a16:creationId xmlns:a16="http://schemas.microsoft.com/office/drawing/2014/main" xmlns="" id="{9ACAD193-9195-4223-B2E6-3ED6534320F1}"/>
+              </a:ext>
+            </a:extLst>
+          </p:cNvPr>
+          <p:cNvSpPr>
+            <a:spLocks noGrp="1"/>
+          </p:cNvSpPr>
+          <p:nvPr>
+            <p:ph idx="1"/>
+          </p:nvPr>
+        </p:nvSpPr>
+        <p:spPr/>
+        <p:txBody>
+          <a:bodyPr/>
+          <a:lstStyle/>
+          <a:p>
+            <a:r>
+              <a:rPr lang="en-US" dirty="0" smtClean="0"/>
+              <a:t>Addition</a:t>
+            </a:r>
+          </a:p>
+          <a:p>
+            <a:pPr lvl="1"/>
+            <a:r>
+              <a:rPr lang="en-US" dirty="0" smtClean="0"/>
+              <a:t>Example on page 16</a:t>
+            </a:r>
+          </a:p>
+          <a:p>
+            <a:r>
+              <a:rPr lang="en-US" dirty="0" smtClean="0"/>
+              <a:t>Subtraction</a:t>
+            </a:r>
+          </a:p>
+          <a:p>
+            <a:pPr lvl="1"/>
+            <a:r>
+              <a:rPr lang="en-US" dirty="0" smtClean="0"/>
+              <a:t>Also addition</a:t>
+            </a:r>
+          </a:p>
+          <a:p>
+            <a:pPr lvl="1"/>
+            <a:r>
+              <a:rPr lang="en-US" dirty="0" smtClean="0"/>
+              <a:t>Two’s compliment</a:t>
+            </a:r>
+          </a:p>
+          <a:p>
+            <a:pPr lvl="1"/>
+            <a:endParaRPr lang="en-US" dirty="0" smtClean="0"/>
+          </a:p>
+          <a:p>
+            <a:r>
+              <a:rPr lang="en-US" dirty="0" smtClean="0"/>
+              <a:t>Signed </a:t>
             </a:r>
             <a:r>
               <a:rPr lang="en-US" dirty="0"/>
-              <a:t> there are 256 shades of red, green, and blue.  </a:t>
-            </a:r>
-          </a:p>
-          <a:p>
-            <a:r>
-              <a:rPr lang="en-US" dirty="0"/>
-              <a:t>Signed versus Unsigned</a:t>
+              <a:t>versus Unsigned</a:t>
             </a:r>
           </a:p>
         </p:txBody>
@@ -7697,7 +8261,7 @@
     </p:spTree>
     <p:extLst>
       <p:ext uri="{BB962C8B-B14F-4D97-AF65-F5344CB8AC3E}">
-        <p14:creationId xmlns:p14="http://schemas.microsoft.com/office/powerpoint/2010/main" val="2215522167"/>
+        <p14:creationId xmlns:p14="http://schemas.microsoft.com/office/powerpoint/2010/main" val="3507829483"/>
       </p:ext>
     </p:extLst>
   </p:cSld>
@@ -8091,8 +8655,12 @@
           </a:p>
           <a:p>
             <a:r>
+              <a:rPr lang="en-US" dirty="0" smtClean="0"/>
+              <a:t>One-to-many </a:t>
+            </a:r>
+            <a:r>
               <a:rPr lang="en-US" dirty="0"/>
-              <a:t>One-to-man relationship with assembly language</a:t>
+              <a:t>relationship with assembly language</a:t>
             </a:r>
           </a:p>
           <a:p>
@@ -8262,7 +8830,7 @@
           <p:cNvPr id="8" name="Rectangle 7">
             <a:extLst>
               <a:ext uri="{FF2B5EF4-FFF2-40B4-BE49-F238E27FC236}">
-                <a16:creationId xmlns:a16="http://schemas.microsoft.com/office/drawing/2014/main" id="{AC3238A1-91E8-417F-99CF-AB4394839E5C}"/>
+                <a16:creationId xmlns:a16="http://schemas.microsoft.com/office/drawing/2014/main" xmlns="" id="{AC3238A1-91E8-417F-99CF-AB4394839E5C}"/>
               </a:ext>
             </a:extLst>
           </p:cNvPr>
@@ -8339,7 +8907,7 @@
           <p:cNvPr id="10" name="Rectangle 9">
             <a:extLst>
               <a:ext uri="{FF2B5EF4-FFF2-40B4-BE49-F238E27FC236}">
-                <a16:creationId xmlns:a16="http://schemas.microsoft.com/office/drawing/2014/main" id="{F1EC6C5A-7F2C-4B19-933C-790A26BD69F1}"/>
+                <a16:creationId xmlns:a16="http://schemas.microsoft.com/office/drawing/2014/main" xmlns="" id="{F1EC6C5A-7F2C-4B19-933C-790A26BD69F1}"/>
               </a:ext>
             </a:extLst>
           </p:cNvPr>
@@ -8472,7 +9040,7 @@
           <p:cNvPr id="11" name="Rectangle 10">
             <a:extLst>
               <a:ext uri="{FF2B5EF4-FFF2-40B4-BE49-F238E27FC236}">
-                <a16:creationId xmlns:a16="http://schemas.microsoft.com/office/drawing/2014/main" id="{7862F89A-33C2-45F4-B103-E3240F48D8A5}"/>
+                <a16:creationId xmlns:a16="http://schemas.microsoft.com/office/drawing/2014/main" xmlns="" id="{7862F89A-33C2-45F4-B103-E3240F48D8A5}"/>
               </a:ext>
             </a:extLst>
           </p:cNvPr>
@@ -8711,7 +9279,7 @@
           <p:cNvPr id="3" name="Content Placeholder 2">
             <a:extLst>
               <a:ext uri="{FF2B5EF4-FFF2-40B4-BE49-F238E27FC236}">
-                <a16:creationId xmlns:a16="http://schemas.microsoft.com/office/drawing/2014/main" id="{9ACAD193-9195-4223-B2E6-3ED6534320F1}"/>
+                <a16:creationId xmlns:a16="http://schemas.microsoft.com/office/drawing/2014/main" xmlns="" id="{9ACAD193-9195-4223-B2E6-3ED6534320F1}"/>
               </a:ext>
             </a:extLst>
           </p:cNvPr>
@@ -8736,7 +9304,7 @@
           <p:cNvPr id="4" name="Picture 3">
             <a:extLst>
               <a:ext uri="{FF2B5EF4-FFF2-40B4-BE49-F238E27FC236}">
-                <a16:creationId xmlns:a16="http://schemas.microsoft.com/office/drawing/2014/main" id="{0E0B0989-3F46-4701-8102-39ABDBB87A87}"/>
+                <a16:creationId xmlns:a16="http://schemas.microsoft.com/office/drawing/2014/main" xmlns="" id="{0E0B0989-3F46-4701-8102-39ABDBB87A87}"/>
               </a:ext>
             </a:extLst>
           </p:cNvPr>
@@ -8830,7 +9398,7 @@
           <p:cNvPr id="3" name="Content Placeholder 2">
             <a:extLst>
               <a:ext uri="{FF2B5EF4-FFF2-40B4-BE49-F238E27FC236}">
-                <a16:creationId xmlns:a16="http://schemas.microsoft.com/office/drawing/2014/main" id="{9ACAD193-9195-4223-B2E6-3ED6534320F1}"/>
+                <a16:creationId xmlns:a16="http://schemas.microsoft.com/office/drawing/2014/main" xmlns="" id="{9ACAD193-9195-4223-B2E6-3ED6534320F1}"/>
               </a:ext>
             </a:extLst>
           </p:cNvPr>
@@ -8855,8 +9423,13 @@
             <a:pPr lvl="1"/>
             <a:r>
               <a:rPr lang="en-US" dirty="0"/>
-              <a:t>What would a trinary language look like?</a:t>
-            </a:r>
+              <a:t>What would a trinary language look like</a:t>
+            </a:r>
+            <a:r>
+              <a:rPr lang="en-US" dirty="0" smtClean="0"/>
+              <a:t>? Unary?</a:t>
+            </a:r>
+            <a:endParaRPr lang="en-US" dirty="0"/>
           </a:p>
           <a:p>
             <a:pPr lvl="1"/>
@@ -8869,8 +9442,13 @@
             <a:pPr lvl="2"/>
             <a:r>
               <a:rPr lang="en-US" dirty="0"/>
-              <a:t>How many combinations are there?</a:t>
-            </a:r>
+              <a:t>How many combinations are </a:t>
+            </a:r>
+            <a:r>
+              <a:rPr lang="en-US" dirty="0" smtClean="0"/>
+              <a:t>there?</a:t>
+            </a:r>
+            <a:endParaRPr lang="en-US" dirty="0"/>
           </a:p>
           <a:p>
             <a:pPr lvl="2"/>

</xml_diff>